<commit_message>
Schema refactoring: Core, Wrapper, Content
</commit_message>
<xml_diff>
--- a/Documentation/TDW-TCSServer 0.22.pptx
+++ b/Documentation/TDW-TCSServer 0.22.pptx
@@ -5,10 +5,11 @@
     <p:sldMasterId id="2147483648" r:id="rId1"/>
   </p:sldMasterIdLst>
   <p:notesMasterIdLst>
-    <p:notesMasterId r:id="rId3"/>
+    <p:notesMasterId r:id="rId4"/>
   </p:notesMasterIdLst>
   <p:sldIdLst>
     <p:sldId id="265" r:id="rId2"/>
+    <p:sldId id="266" r:id="rId3"/>
   </p:sldIdLst>
   <p:sldSz cx="12192000" cy="6858000"/>
   <p:notesSz cx="6858000" cy="9144000"/>
@@ -197,7 +198,7 @@
           <a:p>
             <a:fld id="{0FE97333-F009-4A3A-B903-E0B0959E57FD}" type="datetimeFigureOut">
               <a:rPr lang="en-CA" smtClean="0"/>
-              <a:t>2021-07-07</a:t>
+              <a:t>2021-07-08</a:t>
             </a:fld>
             <a:endParaRPr lang="en-CA" dirty="0"/>
           </a:p>
@@ -698,7 +699,7 @@
           <a:p>
             <a:fld id="{8336BBF9-328D-4796-8CD7-E88E84193EF3}" type="datetimeFigureOut">
               <a:rPr lang="en-CA" smtClean="0"/>
-              <a:t>2021-07-07</a:t>
+              <a:t>2021-07-08</a:t>
             </a:fld>
             <a:endParaRPr lang="en-CA" dirty="0"/>
           </a:p>
@@ -898,7 +899,7 @@
           <a:p>
             <a:fld id="{8336BBF9-328D-4796-8CD7-E88E84193EF3}" type="datetimeFigureOut">
               <a:rPr lang="en-CA" smtClean="0"/>
-              <a:t>2021-07-07</a:t>
+              <a:t>2021-07-08</a:t>
             </a:fld>
             <a:endParaRPr lang="en-CA" dirty="0"/>
           </a:p>
@@ -1108,7 +1109,7 @@
           <a:p>
             <a:fld id="{8336BBF9-328D-4796-8CD7-E88E84193EF3}" type="datetimeFigureOut">
               <a:rPr lang="en-CA" smtClean="0"/>
-              <a:t>2021-07-07</a:t>
+              <a:t>2021-07-08</a:t>
             </a:fld>
             <a:endParaRPr lang="en-CA" dirty="0"/>
           </a:p>
@@ -1308,7 +1309,7 @@
           <a:p>
             <a:fld id="{8336BBF9-328D-4796-8CD7-E88E84193EF3}" type="datetimeFigureOut">
               <a:rPr lang="en-CA" smtClean="0"/>
-              <a:t>2021-07-07</a:t>
+              <a:t>2021-07-08</a:t>
             </a:fld>
             <a:endParaRPr lang="en-CA" dirty="0"/>
           </a:p>
@@ -1584,7 +1585,7 @@
           <a:p>
             <a:fld id="{8336BBF9-328D-4796-8CD7-E88E84193EF3}" type="datetimeFigureOut">
               <a:rPr lang="en-CA" smtClean="0"/>
-              <a:t>2021-07-07</a:t>
+              <a:t>2021-07-08</a:t>
             </a:fld>
             <a:endParaRPr lang="en-CA" dirty="0"/>
           </a:p>
@@ -1852,7 +1853,7 @@
           <a:p>
             <a:fld id="{8336BBF9-328D-4796-8CD7-E88E84193EF3}" type="datetimeFigureOut">
               <a:rPr lang="en-CA" smtClean="0"/>
-              <a:t>2021-07-07</a:t>
+              <a:t>2021-07-08</a:t>
             </a:fld>
             <a:endParaRPr lang="en-CA" dirty="0"/>
           </a:p>
@@ -2267,7 +2268,7 @@
           <a:p>
             <a:fld id="{8336BBF9-328D-4796-8CD7-E88E84193EF3}" type="datetimeFigureOut">
               <a:rPr lang="en-CA" smtClean="0"/>
-              <a:t>2021-07-07</a:t>
+              <a:t>2021-07-08</a:t>
             </a:fld>
             <a:endParaRPr lang="en-CA" dirty="0"/>
           </a:p>
@@ -2409,7 +2410,7 @@
           <a:p>
             <a:fld id="{8336BBF9-328D-4796-8CD7-E88E84193EF3}" type="datetimeFigureOut">
               <a:rPr lang="en-CA" smtClean="0"/>
-              <a:t>2021-07-07</a:t>
+              <a:t>2021-07-08</a:t>
             </a:fld>
             <a:endParaRPr lang="en-CA" dirty="0"/>
           </a:p>
@@ -2522,7 +2523,7 @@
           <a:p>
             <a:fld id="{8336BBF9-328D-4796-8CD7-E88E84193EF3}" type="datetimeFigureOut">
               <a:rPr lang="en-CA" smtClean="0"/>
-              <a:t>2021-07-07</a:t>
+              <a:t>2021-07-08</a:t>
             </a:fld>
             <a:endParaRPr lang="en-CA" dirty="0"/>
           </a:p>
@@ -2835,7 +2836,7 @@
           <a:p>
             <a:fld id="{8336BBF9-328D-4796-8CD7-E88E84193EF3}" type="datetimeFigureOut">
               <a:rPr lang="en-CA" smtClean="0"/>
-              <a:t>2021-07-07</a:t>
+              <a:t>2021-07-08</a:t>
             </a:fld>
             <a:endParaRPr lang="en-CA" dirty="0"/>
           </a:p>
@@ -3124,7 +3125,7 @@
           <a:p>
             <a:fld id="{8336BBF9-328D-4796-8CD7-E88E84193EF3}" type="datetimeFigureOut">
               <a:rPr lang="en-CA" smtClean="0"/>
-              <a:t>2021-07-07</a:t>
+              <a:t>2021-07-08</a:t>
             </a:fld>
             <a:endParaRPr lang="en-CA" dirty="0"/>
           </a:p>
@@ -3367,7 +3368,7 @@
           <a:p>
             <a:fld id="{8336BBF9-328D-4796-8CD7-E88E84193EF3}" type="datetimeFigureOut">
               <a:rPr lang="en-CA" smtClean="0"/>
-              <a:t>2021-07-07</a:t>
+              <a:t>2021-07-08</a:t>
             </a:fld>
             <a:endParaRPr lang="en-CA" dirty="0"/>
           </a:p>
@@ -5467,7 +5468,7 @@
         </p:nvGrpSpPr>
         <p:grpSpPr>
           <a:xfrm>
-            <a:off x="6264" y="4204754"/>
+            <a:off x="79416" y="4204754"/>
             <a:ext cx="13069655" cy="705258"/>
             <a:chOff x="6264" y="3778034"/>
             <a:chExt cx="13069655" cy="705258"/>
@@ -5974,7 +5975,7 @@
             </a:pPr>
             <a:r>
               <a:rPr lang="en-CA" sz="1400" dirty="0"/>
-              <a:t>“Trinity” Schema Language and Automated Code Generator</a:t>
+              <a:t>“Trinity” Schema Language</a:t>
             </a:r>
           </a:p>
           <a:p>
@@ -5984,7 +5985,7 @@
             </a:pPr>
             <a:r>
               <a:rPr lang="en-CA" sz="1400" dirty="0"/>
-              <a:t>Serializable Objects, Messages</a:t>
+              <a:t>Automated Class Generator for Serializable Objects &amp; Messages</a:t>
             </a:r>
           </a:p>
           <a:p>
@@ -6014,7 +6015,7 @@
             </a:pPr>
             <a:r>
               <a:rPr lang="en-CA" sz="1400" dirty="0"/>
-              <a:t>LINQ Query Language</a:t>
+              <a:t>LINQ Query Language supported</a:t>
             </a:r>
           </a:p>
         </p:txBody>
@@ -7574,6 +7575,1805 @@
     <p:extLst>
       <p:ext uri="{BB962C8B-B14F-4D97-AF65-F5344CB8AC3E}">
         <p14:creationId xmlns:p14="http://schemas.microsoft.com/office/powerpoint/2010/main" val="2609338583"/>
+      </p:ext>
+    </p:extLst>
+  </p:cSld>
+  <p:clrMapOvr>
+    <a:masterClrMapping/>
+  </p:clrMapOvr>
+</p:sld>
+</file>
+
+<file path=ppt/slides/slide2.xml><?xml version="1.0" encoding="utf-8"?>
+<p:sld xmlns:a="http://schemas.openxmlformats.org/drawingml/2006/main" xmlns:r="http://schemas.openxmlformats.org/officeDocument/2006/relationships" xmlns:p="http://schemas.openxmlformats.org/presentationml/2006/main">
+  <p:cSld>
+    <p:spTree>
+      <p:nvGrpSpPr>
+        <p:cNvPr id="1" name=""/>
+        <p:cNvGrpSpPr/>
+        <p:nvPr/>
+      </p:nvGrpSpPr>
+      <p:grpSpPr>
+        <a:xfrm>
+          <a:off x="0" y="0"/>
+          <a:ext cx="0" cy="0"/>
+          <a:chOff x="0" y="0"/>
+          <a:chExt cx="0" cy="0"/>
+        </a:xfrm>
+      </p:grpSpPr>
+      <p:sp>
+        <p:nvSpPr>
+          <p:cNvPr id="36" name="Rectangle: Rounded Corners 35">
+            <a:extLst>
+              <a:ext uri="{FF2B5EF4-FFF2-40B4-BE49-F238E27FC236}">
+                <a16:creationId xmlns:a16="http://schemas.microsoft.com/office/drawing/2014/main" id="{501CB077-4080-4DBF-9278-387C09ED69B9}"/>
+              </a:ext>
+            </a:extLst>
+          </p:cNvPr>
+          <p:cNvSpPr/>
+          <p:nvPr/>
+        </p:nvSpPr>
+        <p:spPr>
+          <a:xfrm>
+            <a:off x="1761747" y="1155769"/>
+            <a:ext cx="1130924" cy="2125210"/>
+          </a:xfrm>
+          <a:prstGeom prst="roundRect">
+            <a:avLst/>
+          </a:prstGeom>
+        </p:spPr>
+        <p:style>
+          <a:lnRef idx="2">
+            <a:schemeClr val="accent4">
+              <a:shade val="50000"/>
+            </a:schemeClr>
+          </a:lnRef>
+          <a:fillRef idx="1">
+            <a:schemeClr val="accent4"/>
+          </a:fillRef>
+          <a:effectRef idx="0">
+            <a:schemeClr val="accent4"/>
+          </a:effectRef>
+          <a:fontRef idx="minor">
+            <a:schemeClr val="lt1"/>
+          </a:fontRef>
+        </p:style>
+        <p:txBody>
+          <a:bodyPr rtlCol="0" anchor="ctr"/>
+          <a:lstStyle/>
+          <a:p>
+            <a:pPr algn="ctr"/>
+            <a:r>
+              <a:rPr lang="en-CA" sz="1400" dirty="0"/>
+              <a:t>“Trinity” Serializable Objects &amp;</a:t>
+            </a:r>
+          </a:p>
+          <a:p>
+            <a:pPr algn="ctr"/>
+            <a:r>
+              <a:rPr lang="en-CA" sz="1400" dirty="0"/>
+              <a:t>Accessors</a:t>
+            </a:r>
+          </a:p>
+        </p:txBody>
+      </p:sp>
+      <p:sp>
+        <p:nvSpPr>
+          <p:cNvPr id="4" name="Rectangle: Rounded Corners 3">
+            <a:extLst>
+              <a:ext uri="{FF2B5EF4-FFF2-40B4-BE49-F238E27FC236}">
+                <a16:creationId xmlns:a16="http://schemas.microsoft.com/office/drawing/2014/main" id="{277E75B2-185C-4E18-B14B-3BA545D2ECBB}"/>
+              </a:ext>
+            </a:extLst>
+          </p:cNvPr>
+          <p:cNvSpPr/>
+          <p:nvPr/>
+        </p:nvSpPr>
+        <p:spPr>
+          <a:xfrm>
+            <a:off x="3572261" y="1159573"/>
+            <a:ext cx="2176271" cy="583094"/>
+          </a:xfrm>
+          <a:prstGeom prst="roundRect">
+            <a:avLst/>
+          </a:prstGeom>
+        </p:spPr>
+        <p:style>
+          <a:lnRef idx="2">
+            <a:schemeClr val="accent4">
+              <a:shade val="50000"/>
+            </a:schemeClr>
+          </a:lnRef>
+          <a:fillRef idx="1">
+            <a:schemeClr val="accent4"/>
+          </a:fillRef>
+          <a:effectRef idx="0">
+            <a:schemeClr val="accent4"/>
+          </a:effectRef>
+          <a:fontRef idx="minor">
+            <a:schemeClr val="lt1"/>
+          </a:fontRef>
+        </p:style>
+        <p:txBody>
+          <a:bodyPr rtlCol="0" anchor="ctr"/>
+          <a:lstStyle/>
+          <a:p>
+            <a:pPr algn="ctr"/>
+            <a:r>
+              <a:rPr lang="en-CA" sz="1400" dirty="0"/>
+              <a:t>“Trinity” Cells</a:t>
+            </a:r>
+          </a:p>
+          <a:p>
+            <a:pPr algn="ctr"/>
+            <a:r>
+              <a:rPr lang="en-CA" sz="1400" dirty="0"/>
+              <a:t>(Persistable Objects)</a:t>
+            </a:r>
+          </a:p>
+        </p:txBody>
+      </p:sp>
+      <p:sp>
+        <p:nvSpPr>
+          <p:cNvPr id="33" name="Arrow: U-Turn 32">
+            <a:extLst>
+              <a:ext uri="{FF2B5EF4-FFF2-40B4-BE49-F238E27FC236}">
+                <a16:creationId xmlns:a16="http://schemas.microsoft.com/office/drawing/2014/main" id="{C9A905F6-6013-4B17-8AB3-E9DD6D90F394}"/>
+              </a:ext>
+            </a:extLst>
+          </p:cNvPr>
+          <p:cNvSpPr/>
+          <p:nvPr/>
+        </p:nvSpPr>
+        <p:spPr>
+          <a:xfrm flipH="1">
+            <a:off x="1716341" y="357072"/>
+            <a:ext cx="9991503" cy="2424812"/>
+          </a:xfrm>
+          <a:prstGeom prst="uturnArrow">
+            <a:avLst>
+              <a:gd name="adj1" fmla="val 8294"/>
+              <a:gd name="adj2" fmla="val 25000"/>
+              <a:gd name="adj3" fmla="val 13841"/>
+              <a:gd name="adj4" fmla="val 43750"/>
+              <a:gd name="adj5" fmla="val 33294"/>
+            </a:avLst>
+          </a:prstGeom>
+          <a:solidFill>
+            <a:srgbClr val="00B050"/>
+          </a:solidFill>
+        </p:spPr>
+        <p:style>
+          <a:lnRef idx="2">
+            <a:schemeClr val="accent1">
+              <a:shade val="50000"/>
+            </a:schemeClr>
+          </a:lnRef>
+          <a:fillRef idx="1">
+            <a:schemeClr val="accent1"/>
+          </a:fillRef>
+          <a:effectRef idx="0">
+            <a:schemeClr val="accent1"/>
+          </a:effectRef>
+          <a:fontRef idx="minor">
+            <a:schemeClr val="lt1"/>
+          </a:fontRef>
+        </p:style>
+        <p:txBody>
+          <a:bodyPr rtlCol="0" anchor="ctr"/>
+          <a:lstStyle/>
+          <a:p>
+            <a:pPr algn="ctr"/>
+            <a:endParaRPr lang="en-CA" dirty="0">
+              <a:solidFill>
+                <a:schemeClr val="tx1"/>
+              </a:solidFill>
+            </a:endParaRPr>
+          </a:p>
+        </p:txBody>
+      </p:sp>
+      <p:sp>
+        <p:nvSpPr>
+          <p:cNvPr id="3" name="Rectangle: Rounded Corners 2">
+            <a:extLst>
+              <a:ext uri="{FF2B5EF4-FFF2-40B4-BE49-F238E27FC236}">
+                <a16:creationId xmlns:a16="http://schemas.microsoft.com/office/drawing/2014/main" id="{2B2E2EA8-DBD3-4773-A260-C2F738ECF4D4}"/>
+              </a:ext>
+            </a:extLst>
+          </p:cNvPr>
+          <p:cNvSpPr/>
+          <p:nvPr/>
+        </p:nvSpPr>
+        <p:spPr>
+          <a:xfrm>
+            <a:off x="-1549637" y="3707532"/>
+            <a:ext cx="12795452" cy="583094"/>
+          </a:xfrm>
+          <a:prstGeom prst="roundRect">
+            <a:avLst/>
+          </a:prstGeom>
+        </p:spPr>
+        <p:style>
+          <a:lnRef idx="2">
+            <a:schemeClr val="accent4">
+              <a:shade val="50000"/>
+            </a:schemeClr>
+          </a:lnRef>
+          <a:fillRef idx="1">
+            <a:schemeClr val="accent4"/>
+          </a:fillRef>
+          <a:effectRef idx="0">
+            <a:schemeClr val="accent4"/>
+          </a:effectRef>
+          <a:fontRef idx="minor">
+            <a:schemeClr val="lt1"/>
+          </a:fontRef>
+        </p:style>
+        <p:txBody>
+          <a:bodyPr rtlCol="0" anchor="ctr"/>
+          <a:lstStyle/>
+          <a:p>
+            <a:pPr algn="ctr"/>
+            <a:r>
+              <a:rPr lang="en-CA" sz="1400" dirty="0"/>
+              <a:t>“Trinity” Schema-driven Automatic Code Generation (C# Classes)</a:t>
+            </a:r>
+          </a:p>
+        </p:txBody>
+      </p:sp>
+      <p:sp>
+        <p:nvSpPr>
+          <p:cNvPr id="5" name="Rectangle: Rounded Corners 4">
+            <a:extLst>
+              <a:ext uri="{FF2B5EF4-FFF2-40B4-BE49-F238E27FC236}">
+                <a16:creationId xmlns:a16="http://schemas.microsoft.com/office/drawing/2014/main" id="{A6E6C6C0-2977-4829-9904-20ED80038EDB}"/>
+              </a:ext>
+            </a:extLst>
+          </p:cNvPr>
+          <p:cNvSpPr/>
+          <p:nvPr/>
+        </p:nvSpPr>
+        <p:spPr>
+          <a:xfrm>
+            <a:off x="3572263" y="1984545"/>
+            <a:ext cx="2176269" cy="583094"/>
+          </a:xfrm>
+          <a:prstGeom prst="roundRect">
+            <a:avLst/>
+          </a:prstGeom>
+        </p:spPr>
+        <p:style>
+          <a:lnRef idx="2">
+            <a:schemeClr val="accent4">
+              <a:shade val="50000"/>
+            </a:schemeClr>
+          </a:lnRef>
+          <a:fillRef idx="1">
+            <a:schemeClr val="accent4"/>
+          </a:fillRef>
+          <a:effectRef idx="0">
+            <a:schemeClr val="accent4"/>
+          </a:effectRef>
+          <a:fontRef idx="minor">
+            <a:schemeClr val="lt1"/>
+          </a:fontRef>
+        </p:style>
+        <p:txBody>
+          <a:bodyPr rtlCol="0" anchor="ctr"/>
+          <a:lstStyle/>
+          <a:p>
+            <a:pPr algn="ctr"/>
+            <a:r>
+              <a:rPr lang="en-CA" sz="1400" dirty="0"/>
+              <a:t>“Trinity” Request Messages</a:t>
+            </a:r>
+          </a:p>
+        </p:txBody>
+      </p:sp>
+      <p:sp>
+        <p:nvSpPr>
+          <p:cNvPr id="6" name="Rectangle: Rounded Corners 5">
+            <a:extLst>
+              <a:ext uri="{FF2B5EF4-FFF2-40B4-BE49-F238E27FC236}">
+                <a16:creationId xmlns:a16="http://schemas.microsoft.com/office/drawing/2014/main" id="{E522E1DB-1CDB-4809-B21F-6FD41784D482}"/>
+              </a:ext>
+            </a:extLst>
+          </p:cNvPr>
+          <p:cNvSpPr/>
+          <p:nvPr/>
+        </p:nvSpPr>
+        <p:spPr>
+          <a:xfrm>
+            <a:off x="3572262" y="2699789"/>
+            <a:ext cx="2176269" cy="583094"/>
+          </a:xfrm>
+          <a:prstGeom prst="roundRect">
+            <a:avLst/>
+          </a:prstGeom>
+        </p:spPr>
+        <p:style>
+          <a:lnRef idx="2">
+            <a:schemeClr val="accent4">
+              <a:shade val="50000"/>
+            </a:schemeClr>
+          </a:lnRef>
+          <a:fillRef idx="1">
+            <a:schemeClr val="accent4"/>
+          </a:fillRef>
+          <a:effectRef idx="0">
+            <a:schemeClr val="accent4"/>
+          </a:effectRef>
+          <a:fontRef idx="minor">
+            <a:schemeClr val="lt1"/>
+          </a:fontRef>
+        </p:style>
+        <p:txBody>
+          <a:bodyPr rtlCol="0" anchor="ctr"/>
+          <a:lstStyle/>
+          <a:p>
+            <a:pPr algn="ctr"/>
+            <a:r>
+              <a:rPr lang="en-CA" sz="1400" dirty="0"/>
+              <a:t>“Trinity” Response Messages</a:t>
+            </a:r>
+          </a:p>
+        </p:txBody>
+      </p:sp>
+      <p:sp>
+        <p:nvSpPr>
+          <p:cNvPr id="7" name="Rectangle: Rounded Corners 6">
+            <a:extLst>
+              <a:ext uri="{FF2B5EF4-FFF2-40B4-BE49-F238E27FC236}">
+                <a16:creationId xmlns:a16="http://schemas.microsoft.com/office/drawing/2014/main" id="{6E3326DF-788B-43C7-B2D2-0E4725CEB521}"/>
+              </a:ext>
+            </a:extLst>
+          </p:cNvPr>
+          <p:cNvSpPr/>
+          <p:nvPr/>
+        </p:nvSpPr>
+        <p:spPr>
+          <a:xfrm>
+            <a:off x="6443566" y="1982643"/>
+            <a:ext cx="2176269" cy="583094"/>
+          </a:xfrm>
+          <a:prstGeom prst="roundRect">
+            <a:avLst/>
+          </a:prstGeom>
+        </p:spPr>
+        <p:style>
+          <a:lnRef idx="2">
+            <a:schemeClr val="accent4">
+              <a:shade val="50000"/>
+            </a:schemeClr>
+          </a:lnRef>
+          <a:fillRef idx="1">
+            <a:schemeClr val="accent4"/>
+          </a:fillRef>
+          <a:effectRef idx="0">
+            <a:schemeClr val="accent4"/>
+          </a:effectRef>
+          <a:fontRef idx="minor">
+            <a:schemeClr val="lt1"/>
+          </a:fontRef>
+        </p:style>
+        <p:txBody>
+          <a:bodyPr rtlCol="0" anchor="ctr"/>
+          <a:lstStyle/>
+          <a:p>
+            <a:pPr algn="ctr"/>
+            <a:r>
+              <a:rPr lang="en-CA" sz="1400" dirty="0"/>
+              <a:t>“Trinity” Private Protocols (Sync/Async)</a:t>
+            </a:r>
+          </a:p>
+        </p:txBody>
+      </p:sp>
+      <p:sp>
+        <p:nvSpPr>
+          <p:cNvPr id="8" name="Rectangle: Rounded Corners 7">
+            <a:extLst>
+              <a:ext uri="{FF2B5EF4-FFF2-40B4-BE49-F238E27FC236}">
+                <a16:creationId xmlns:a16="http://schemas.microsoft.com/office/drawing/2014/main" id="{65F74433-3C8B-4CA0-BD15-AD4BD4AD6DCB}"/>
+              </a:ext>
+            </a:extLst>
+          </p:cNvPr>
+          <p:cNvSpPr/>
+          <p:nvPr/>
+        </p:nvSpPr>
+        <p:spPr>
+          <a:xfrm>
+            <a:off x="6443567" y="2697887"/>
+            <a:ext cx="2176268" cy="583094"/>
+          </a:xfrm>
+          <a:prstGeom prst="roundRect">
+            <a:avLst/>
+          </a:prstGeom>
+        </p:spPr>
+        <p:style>
+          <a:lnRef idx="2">
+            <a:schemeClr val="accent4">
+              <a:shade val="50000"/>
+            </a:schemeClr>
+          </a:lnRef>
+          <a:fillRef idx="1">
+            <a:schemeClr val="accent4"/>
+          </a:fillRef>
+          <a:effectRef idx="0">
+            <a:schemeClr val="accent4"/>
+          </a:effectRef>
+          <a:fontRef idx="minor">
+            <a:schemeClr val="lt1"/>
+          </a:fontRef>
+        </p:style>
+        <p:txBody>
+          <a:bodyPr rtlCol="0" anchor="ctr"/>
+          <a:lstStyle/>
+          <a:p>
+            <a:pPr algn="ctr"/>
+            <a:r>
+              <a:rPr lang="en-CA" sz="1400" dirty="0"/>
+              <a:t>“Trinity” Public Protocols (REST/HTTP)</a:t>
+            </a:r>
+          </a:p>
+        </p:txBody>
+      </p:sp>
+      <p:sp>
+        <p:nvSpPr>
+          <p:cNvPr id="9" name="Rectangle: Rounded Corners 8">
+            <a:extLst>
+              <a:ext uri="{FF2B5EF4-FFF2-40B4-BE49-F238E27FC236}">
+                <a16:creationId xmlns:a16="http://schemas.microsoft.com/office/drawing/2014/main" id="{58C56894-F593-47EC-B94B-EC017C1A8B7B}"/>
+              </a:ext>
+            </a:extLst>
+          </p:cNvPr>
+          <p:cNvSpPr/>
+          <p:nvPr/>
+        </p:nvSpPr>
+        <p:spPr>
+          <a:xfrm>
+            <a:off x="9320787" y="1981693"/>
+            <a:ext cx="1925028" cy="716194"/>
+          </a:xfrm>
+          <a:prstGeom prst="roundRect">
+            <a:avLst/>
+          </a:prstGeom>
+        </p:spPr>
+        <p:style>
+          <a:lnRef idx="2">
+            <a:schemeClr val="accent4">
+              <a:shade val="50000"/>
+            </a:schemeClr>
+          </a:lnRef>
+          <a:fillRef idx="1">
+            <a:schemeClr val="accent4"/>
+          </a:fillRef>
+          <a:effectRef idx="0">
+            <a:schemeClr val="accent4"/>
+          </a:effectRef>
+          <a:fontRef idx="minor">
+            <a:schemeClr val="lt1"/>
+          </a:fontRef>
+        </p:style>
+        <p:txBody>
+          <a:bodyPr rtlCol="0" anchor="ctr"/>
+          <a:lstStyle/>
+          <a:p>
+            <a:pPr algn="ctr"/>
+            <a:r>
+              <a:rPr lang="en-CA" sz="1400" dirty="0"/>
+              <a:t>“Trinity” </a:t>
+            </a:r>
+            <a:r>
+              <a:rPr lang="en-CA" sz="1400" dirty="0" err="1"/>
+              <a:t>Microservers</a:t>
+            </a:r>
+            <a:endParaRPr lang="en-CA" sz="1400" dirty="0"/>
+          </a:p>
+        </p:txBody>
+      </p:sp>
+      <p:sp>
+        <p:nvSpPr>
+          <p:cNvPr id="10" name="Rectangle: Rounded Corners 9">
+            <a:extLst>
+              <a:ext uri="{FF2B5EF4-FFF2-40B4-BE49-F238E27FC236}">
+                <a16:creationId xmlns:a16="http://schemas.microsoft.com/office/drawing/2014/main" id="{78216DF3-FC8C-4B1E-8EAB-6C621A4FAC9A}"/>
+              </a:ext>
+            </a:extLst>
+          </p:cNvPr>
+          <p:cNvSpPr/>
+          <p:nvPr/>
+        </p:nvSpPr>
+        <p:spPr>
+          <a:xfrm>
+            <a:off x="6443567" y="1157671"/>
+            <a:ext cx="2176270" cy="583094"/>
+          </a:xfrm>
+          <a:prstGeom prst="roundRect">
+            <a:avLst/>
+          </a:prstGeom>
+        </p:spPr>
+        <p:style>
+          <a:lnRef idx="2">
+            <a:schemeClr val="accent4">
+              <a:shade val="50000"/>
+            </a:schemeClr>
+          </a:lnRef>
+          <a:fillRef idx="1">
+            <a:schemeClr val="accent4"/>
+          </a:fillRef>
+          <a:effectRef idx="0">
+            <a:schemeClr val="accent4"/>
+          </a:effectRef>
+          <a:fontRef idx="minor">
+            <a:schemeClr val="lt1"/>
+          </a:fontRef>
+        </p:style>
+        <p:txBody>
+          <a:bodyPr rtlCol="0" anchor="ctr"/>
+          <a:lstStyle/>
+          <a:p>
+            <a:pPr algn="ctr"/>
+            <a:r>
+              <a:rPr lang="en-CA" sz="1400" dirty="0"/>
+              <a:t>“Trinity” Hashtable </a:t>
+            </a:r>
+          </a:p>
+          <a:p>
+            <a:pPr algn="ctr"/>
+            <a:r>
+              <a:rPr lang="en-CA" sz="1400" dirty="0"/>
+              <a:t>Clusterable In-Memory Storage</a:t>
+            </a:r>
+          </a:p>
+        </p:txBody>
+      </p:sp>
+      <p:sp>
+        <p:nvSpPr>
+          <p:cNvPr id="11" name="Rectangle: Rounded Corners 10">
+            <a:extLst>
+              <a:ext uri="{FF2B5EF4-FFF2-40B4-BE49-F238E27FC236}">
+                <a16:creationId xmlns:a16="http://schemas.microsoft.com/office/drawing/2014/main" id="{C8B667D0-1EED-465D-A095-1895EB632200}"/>
+              </a:ext>
+            </a:extLst>
+          </p:cNvPr>
+          <p:cNvSpPr/>
+          <p:nvPr/>
+        </p:nvSpPr>
+        <p:spPr>
+          <a:xfrm>
+            <a:off x="9320786" y="2830989"/>
+            <a:ext cx="2824561" cy="449992"/>
+          </a:xfrm>
+          <a:prstGeom prst="roundRect">
+            <a:avLst/>
+          </a:prstGeom>
+        </p:spPr>
+        <p:style>
+          <a:lnRef idx="2">
+            <a:schemeClr val="accent4">
+              <a:shade val="50000"/>
+            </a:schemeClr>
+          </a:lnRef>
+          <a:fillRef idx="1">
+            <a:schemeClr val="accent4"/>
+          </a:fillRef>
+          <a:effectRef idx="0">
+            <a:schemeClr val="accent4"/>
+          </a:effectRef>
+          <a:fontRef idx="minor">
+            <a:schemeClr val="lt1"/>
+          </a:fontRef>
+        </p:style>
+        <p:txBody>
+          <a:bodyPr rtlCol="0" anchor="ctr"/>
+          <a:lstStyle/>
+          <a:p>
+            <a:pPr algn="ctr"/>
+            <a:r>
+              <a:rPr lang="en-CA" sz="1400" dirty="0"/>
+              <a:t>“Trinity” Service Endpoint Handlers (Custom Code)</a:t>
+            </a:r>
+          </a:p>
+        </p:txBody>
+      </p:sp>
+      <p:sp>
+        <p:nvSpPr>
+          <p:cNvPr id="12" name="Rectangle: Rounded Corners 11">
+            <a:extLst>
+              <a:ext uri="{FF2B5EF4-FFF2-40B4-BE49-F238E27FC236}">
+                <a16:creationId xmlns:a16="http://schemas.microsoft.com/office/drawing/2014/main" id="{E423DFAB-EB82-4FE0-A858-1443609C3F91}"/>
+              </a:ext>
+            </a:extLst>
+          </p:cNvPr>
+          <p:cNvSpPr/>
+          <p:nvPr/>
+        </p:nvSpPr>
+        <p:spPr>
+          <a:xfrm>
+            <a:off x="9320787" y="1155769"/>
+            <a:ext cx="1925028" cy="583094"/>
+          </a:xfrm>
+          <a:prstGeom prst="roundRect">
+            <a:avLst/>
+          </a:prstGeom>
+        </p:spPr>
+        <p:style>
+          <a:lnRef idx="2">
+            <a:schemeClr val="accent4">
+              <a:shade val="50000"/>
+            </a:schemeClr>
+          </a:lnRef>
+          <a:fillRef idx="1">
+            <a:schemeClr val="accent4"/>
+          </a:fillRef>
+          <a:effectRef idx="0">
+            <a:schemeClr val="accent4"/>
+          </a:effectRef>
+          <a:fontRef idx="minor">
+            <a:schemeClr val="lt1"/>
+          </a:fontRef>
+        </p:style>
+        <p:txBody>
+          <a:bodyPr rtlCol="0" anchor="ctr"/>
+          <a:lstStyle/>
+          <a:p>
+            <a:pPr algn="ctr"/>
+            <a:r>
+              <a:rPr lang="en-CA" sz="1400" dirty="0"/>
+              <a:t>“Trinity” Local Device Clusterable Persistent Storage</a:t>
+            </a:r>
+          </a:p>
+        </p:txBody>
+      </p:sp>
+      <p:sp>
+        <p:nvSpPr>
+          <p:cNvPr id="13" name="Arrow: Down 12">
+            <a:extLst>
+              <a:ext uri="{FF2B5EF4-FFF2-40B4-BE49-F238E27FC236}">
+                <a16:creationId xmlns:a16="http://schemas.microsoft.com/office/drawing/2014/main" id="{FD4A5998-C86A-4163-8483-57E690C00AA3}"/>
+              </a:ext>
+            </a:extLst>
+          </p:cNvPr>
+          <p:cNvSpPr/>
+          <p:nvPr/>
+        </p:nvSpPr>
+        <p:spPr>
+          <a:xfrm>
+            <a:off x="-296666" y="3346344"/>
+            <a:ext cx="310896" cy="286680"/>
+          </a:xfrm>
+          <a:prstGeom prst="downArrow">
+            <a:avLst/>
+          </a:prstGeom>
+          <a:solidFill>
+            <a:srgbClr val="00B0F0"/>
+          </a:solidFill>
+        </p:spPr>
+        <p:style>
+          <a:lnRef idx="2">
+            <a:schemeClr val="accent1">
+              <a:shade val="50000"/>
+            </a:schemeClr>
+          </a:lnRef>
+          <a:fillRef idx="1">
+            <a:schemeClr val="accent1"/>
+          </a:fillRef>
+          <a:effectRef idx="0">
+            <a:schemeClr val="accent1"/>
+          </a:effectRef>
+          <a:fontRef idx="minor">
+            <a:schemeClr val="lt1"/>
+          </a:fontRef>
+        </p:style>
+        <p:txBody>
+          <a:bodyPr rtlCol="0" anchor="ctr"/>
+          <a:lstStyle/>
+          <a:p>
+            <a:pPr algn="ctr"/>
+            <a:endParaRPr lang="en-CA"/>
+          </a:p>
+        </p:txBody>
+      </p:sp>
+      <p:sp>
+        <p:nvSpPr>
+          <p:cNvPr id="14" name="Arrow: Down 13">
+            <a:extLst>
+              <a:ext uri="{FF2B5EF4-FFF2-40B4-BE49-F238E27FC236}">
+                <a16:creationId xmlns:a16="http://schemas.microsoft.com/office/drawing/2014/main" id="{C40B1782-2E8E-4168-8CB1-716B397CEBAD}"/>
+              </a:ext>
+            </a:extLst>
+          </p:cNvPr>
+          <p:cNvSpPr/>
+          <p:nvPr/>
+        </p:nvSpPr>
+        <p:spPr>
+          <a:xfrm rot="10800000">
+            <a:off x="4504948" y="3346344"/>
+            <a:ext cx="310896" cy="286680"/>
+          </a:xfrm>
+          <a:prstGeom prst="downArrow">
+            <a:avLst/>
+          </a:prstGeom>
+          <a:solidFill>
+            <a:srgbClr val="00B0F0"/>
+          </a:solidFill>
+        </p:spPr>
+        <p:style>
+          <a:lnRef idx="2">
+            <a:schemeClr val="accent1">
+              <a:shade val="50000"/>
+            </a:schemeClr>
+          </a:lnRef>
+          <a:fillRef idx="1">
+            <a:schemeClr val="accent1"/>
+          </a:fillRef>
+          <a:effectRef idx="0">
+            <a:schemeClr val="accent1"/>
+          </a:effectRef>
+          <a:fontRef idx="minor">
+            <a:schemeClr val="lt1"/>
+          </a:fontRef>
+        </p:style>
+        <p:txBody>
+          <a:bodyPr rtlCol="0" anchor="ctr"/>
+          <a:lstStyle/>
+          <a:p>
+            <a:pPr algn="ctr"/>
+            <a:endParaRPr lang="en-CA"/>
+          </a:p>
+        </p:txBody>
+      </p:sp>
+      <p:sp>
+        <p:nvSpPr>
+          <p:cNvPr id="15" name="Arrow: Down 14">
+            <a:extLst>
+              <a:ext uri="{FF2B5EF4-FFF2-40B4-BE49-F238E27FC236}">
+                <a16:creationId xmlns:a16="http://schemas.microsoft.com/office/drawing/2014/main" id="{371A9FD7-0288-4BA2-B269-4E8CFE6D0C67}"/>
+              </a:ext>
+            </a:extLst>
+          </p:cNvPr>
+          <p:cNvSpPr/>
+          <p:nvPr/>
+        </p:nvSpPr>
+        <p:spPr>
+          <a:xfrm rot="10800000">
+            <a:off x="7376252" y="3346344"/>
+            <a:ext cx="310896" cy="286680"/>
+          </a:xfrm>
+          <a:prstGeom prst="downArrow">
+            <a:avLst/>
+          </a:prstGeom>
+          <a:solidFill>
+            <a:srgbClr val="00B0F0"/>
+          </a:solidFill>
+        </p:spPr>
+        <p:style>
+          <a:lnRef idx="2">
+            <a:schemeClr val="accent1">
+              <a:shade val="50000"/>
+            </a:schemeClr>
+          </a:lnRef>
+          <a:fillRef idx="1">
+            <a:schemeClr val="accent1"/>
+          </a:fillRef>
+          <a:effectRef idx="0">
+            <a:schemeClr val="accent1"/>
+          </a:effectRef>
+          <a:fontRef idx="minor">
+            <a:schemeClr val="lt1"/>
+          </a:fontRef>
+        </p:style>
+        <p:txBody>
+          <a:bodyPr rtlCol="0" anchor="ctr"/>
+          <a:lstStyle/>
+          <a:p>
+            <a:pPr algn="ctr"/>
+            <a:endParaRPr lang="en-CA"/>
+          </a:p>
+        </p:txBody>
+      </p:sp>
+      <p:sp>
+        <p:nvSpPr>
+          <p:cNvPr id="16" name="Arrow: Down 15">
+            <a:extLst>
+              <a:ext uri="{FF2B5EF4-FFF2-40B4-BE49-F238E27FC236}">
+                <a16:creationId xmlns:a16="http://schemas.microsoft.com/office/drawing/2014/main" id="{02098623-D077-4304-8334-E0DD846BF866}"/>
+              </a:ext>
+            </a:extLst>
+          </p:cNvPr>
+          <p:cNvSpPr/>
+          <p:nvPr/>
+        </p:nvSpPr>
+        <p:spPr>
+          <a:xfrm rot="10800000">
+            <a:off x="10127853" y="3346345"/>
+            <a:ext cx="310896" cy="286680"/>
+          </a:xfrm>
+          <a:prstGeom prst="downArrow">
+            <a:avLst/>
+          </a:prstGeom>
+          <a:solidFill>
+            <a:srgbClr val="00B0F0"/>
+          </a:solidFill>
+        </p:spPr>
+        <p:style>
+          <a:lnRef idx="2">
+            <a:schemeClr val="accent1">
+              <a:shade val="50000"/>
+            </a:schemeClr>
+          </a:lnRef>
+          <a:fillRef idx="1">
+            <a:schemeClr val="accent1"/>
+          </a:fillRef>
+          <a:effectRef idx="0">
+            <a:schemeClr val="accent1"/>
+          </a:effectRef>
+          <a:fontRef idx="minor">
+            <a:schemeClr val="lt1"/>
+          </a:fontRef>
+        </p:style>
+        <p:txBody>
+          <a:bodyPr rtlCol="0" anchor="ctr"/>
+          <a:lstStyle/>
+          <a:p>
+            <a:pPr algn="ctr"/>
+            <a:endParaRPr lang="en-CA"/>
+          </a:p>
+        </p:txBody>
+      </p:sp>
+      <p:grpSp>
+        <p:nvGrpSpPr>
+          <p:cNvPr id="24" name="Group 23">
+            <a:extLst>
+              <a:ext uri="{FF2B5EF4-FFF2-40B4-BE49-F238E27FC236}">
+                <a16:creationId xmlns:a16="http://schemas.microsoft.com/office/drawing/2014/main" id="{AA7FB23D-0423-4812-96AF-71861D123231}"/>
+              </a:ext>
+            </a:extLst>
+          </p:cNvPr>
+          <p:cNvGrpSpPr/>
+          <p:nvPr/>
+        </p:nvGrpSpPr>
+        <p:grpSpPr>
+          <a:xfrm>
+            <a:off x="-1549637" y="1155769"/>
+            <a:ext cx="2871309" cy="2125211"/>
+            <a:chOff x="0" y="1265496"/>
+            <a:chExt cx="2871309" cy="2015484"/>
+          </a:xfrm>
+        </p:grpSpPr>
+        <p:sp>
+          <p:nvSpPr>
+            <p:cNvPr id="2" name="Rectangle: Rounded Corners 1">
+              <a:extLst>
+                <a:ext uri="{FF2B5EF4-FFF2-40B4-BE49-F238E27FC236}">
+                  <a16:creationId xmlns:a16="http://schemas.microsoft.com/office/drawing/2014/main" id="{D6C9D767-AAEA-4AD8-A8D0-60D2E36C8D90}"/>
+                </a:ext>
+              </a:extLst>
+            </p:cNvPr>
+            <p:cNvSpPr/>
+            <p:nvPr/>
+          </p:nvSpPr>
+          <p:spPr>
+            <a:xfrm>
+              <a:off x="0" y="1265496"/>
+              <a:ext cx="2871309" cy="2015484"/>
+            </a:xfrm>
+            <a:prstGeom prst="roundRect">
+              <a:avLst>
+                <a:gd name="adj" fmla="val 4417"/>
+              </a:avLst>
+            </a:prstGeom>
+          </p:spPr>
+          <p:style>
+            <a:lnRef idx="2">
+              <a:schemeClr val="accent4">
+                <a:shade val="50000"/>
+              </a:schemeClr>
+            </a:lnRef>
+            <a:fillRef idx="1">
+              <a:schemeClr val="accent4"/>
+            </a:fillRef>
+            <a:effectRef idx="0">
+              <a:schemeClr val="accent4"/>
+            </a:effectRef>
+            <a:fontRef idx="minor">
+              <a:schemeClr val="lt1"/>
+            </a:fontRef>
+          </p:style>
+          <p:txBody>
+            <a:bodyPr rtlCol="0" anchor="ctr"/>
+            <a:lstStyle/>
+            <a:p>
+              <a:r>
+                <a:rPr lang="en-CA" sz="1400" dirty="0"/>
+                <a:t>“Trinity” Schema Files</a:t>
+              </a:r>
+            </a:p>
+            <a:p>
+              <a:r>
+                <a:rPr lang="en-CA" sz="1400" dirty="0"/>
+                <a:t>(Trinity</a:t>
+              </a:r>
+            </a:p>
+            <a:p>
+              <a:r>
+                <a:rPr lang="en-CA" sz="1400" dirty="0"/>
+                <a:t>Specification</a:t>
+              </a:r>
+            </a:p>
+            <a:p>
+              <a:r>
+                <a:rPr lang="en-CA" sz="1400" dirty="0"/>
+                <a:t>Language)</a:t>
+              </a:r>
+            </a:p>
+          </p:txBody>
+        </p:sp>
+        <p:sp>
+          <p:nvSpPr>
+            <p:cNvPr id="17" name="Rectangle: Rounded Corners 16">
+              <a:extLst>
+                <a:ext uri="{FF2B5EF4-FFF2-40B4-BE49-F238E27FC236}">
+                  <a16:creationId xmlns:a16="http://schemas.microsoft.com/office/drawing/2014/main" id="{45AD1044-7306-4F29-BF0F-D8FDB3794A8A}"/>
+                </a:ext>
+              </a:extLst>
+            </p:cNvPr>
+            <p:cNvSpPr/>
+            <p:nvPr/>
+          </p:nvSpPr>
+          <p:spPr>
+            <a:xfrm>
+              <a:off x="1745581" y="1398599"/>
+              <a:ext cx="997714" cy="1765412"/>
+            </a:xfrm>
+            <a:prstGeom prst="roundRect">
+              <a:avLst/>
+            </a:prstGeom>
+            <a:solidFill>
+              <a:schemeClr val="accent4">
+                <a:lumMod val="75000"/>
+              </a:schemeClr>
+            </a:solidFill>
+          </p:spPr>
+          <p:style>
+            <a:lnRef idx="2">
+              <a:schemeClr val="accent4">
+                <a:shade val="50000"/>
+              </a:schemeClr>
+            </a:lnRef>
+            <a:fillRef idx="1">
+              <a:schemeClr val="accent4"/>
+            </a:fillRef>
+            <a:effectRef idx="0">
+              <a:schemeClr val="accent4"/>
+            </a:effectRef>
+            <a:fontRef idx="minor">
+              <a:schemeClr val="lt1"/>
+            </a:fontRef>
+          </p:style>
+          <p:txBody>
+            <a:bodyPr rtlCol="0" anchor="ctr"/>
+            <a:lstStyle/>
+            <a:p>
+              <a:pPr algn="ctr"/>
+              <a:r>
+                <a:rPr lang="en-CA" sz="1200" dirty="0"/>
+                <a:t>“Trinity” Enums, Structures,</a:t>
+              </a:r>
+            </a:p>
+            <a:p>
+              <a:pPr algn="ctr"/>
+              <a:r>
+                <a:rPr lang="en-CA" sz="1200" dirty="0"/>
+                <a:t>Cells,</a:t>
+              </a:r>
+            </a:p>
+            <a:p>
+              <a:pPr algn="ctr"/>
+              <a:r>
+                <a:rPr lang="en-CA" sz="1200" dirty="0"/>
+                <a:t>Messages,</a:t>
+              </a:r>
+            </a:p>
+            <a:p>
+              <a:pPr algn="ctr"/>
+              <a:r>
+                <a:rPr lang="en-CA" sz="1200" dirty="0"/>
+                <a:t>Protocols,</a:t>
+              </a:r>
+            </a:p>
+            <a:p>
+              <a:pPr algn="ctr"/>
+              <a:r>
+                <a:rPr lang="en-CA" sz="1200" dirty="0"/>
+                <a:t>Servers</a:t>
+              </a:r>
+            </a:p>
+          </p:txBody>
+        </p:sp>
+      </p:grpSp>
+      <p:sp>
+        <p:nvSpPr>
+          <p:cNvPr id="18" name="Rectangle: Rounded Corners 17">
+            <a:extLst>
+              <a:ext uri="{FF2B5EF4-FFF2-40B4-BE49-F238E27FC236}">
+                <a16:creationId xmlns:a16="http://schemas.microsoft.com/office/drawing/2014/main" id="{D89ED192-702A-40AA-AE0A-469FE5E7EB7A}"/>
+              </a:ext>
+            </a:extLst>
+          </p:cNvPr>
+          <p:cNvSpPr/>
+          <p:nvPr/>
+        </p:nvSpPr>
+        <p:spPr>
+          <a:xfrm>
+            <a:off x="-1549638" y="5057811"/>
+            <a:ext cx="12795453" cy="587162"/>
+          </a:xfrm>
+          <a:prstGeom prst="roundRect">
+            <a:avLst/>
+          </a:prstGeom>
+        </p:spPr>
+        <p:style>
+          <a:lnRef idx="1">
+            <a:schemeClr val="accent3"/>
+          </a:lnRef>
+          <a:fillRef idx="2">
+            <a:schemeClr val="accent3"/>
+          </a:fillRef>
+          <a:effectRef idx="1">
+            <a:schemeClr val="accent3"/>
+          </a:effectRef>
+          <a:fontRef idx="minor">
+            <a:schemeClr val="dk1"/>
+          </a:fontRef>
+        </p:style>
+        <p:txBody>
+          <a:bodyPr rtlCol="0" anchor="ctr"/>
+          <a:lstStyle/>
+          <a:p>
+            <a:pPr algn="ctr"/>
+            <a:r>
+              <a:rPr lang="en-CA" sz="1400" dirty="0"/>
+              <a:t>Microsoft Common Language Runtime (CLR)</a:t>
+            </a:r>
+          </a:p>
+        </p:txBody>
+      </p:sp>
+      <p:sp>
+        <p:nvSpPr>
+          <p:cNvPr id="19" name="Rectangle: Rounded Corners 18">
+            <a:extLst>
+              <a:ext uri="{FF2B5EF4-FFF2-40B4-BE49-F238E27FC236}">
+                <a16:creationId xmlns:a16="http://schemas.microsoft.com/office/drawing/2014/main" id="{BD7A6123-E3B7-408C-A344-EFF33E693BEA}"/>
+              </a:ext>
+            </a:extLst>
+          </p:cNvPr>
+          <p:cNvSpPr/>
+          <p:nvPr/>
+        </p:nvSpPr>
+        <p:spPr>
+          <a:xfrm>
+            <a:off x="-1549638" y="4468028"/>
+            <a:ext cx="12795452" cy="494493"/>
+          </a:xfrm>
+          <a:prstGeom prst="roundRect">
+            <a:avLst/>
+          </a:prstGeom>
+        </p:spPr>
+        <p:style>
+          <a:lnRef idx="1">
+            <a:schemeClr val="accent3"/>
+          </a:lnRef>
+          <a:fillRef idx="2">
+            <a:schemeClr val="accent3"/>
+          </a:fillRef>
+          <a:effectRef idx="1">
+            <a:schemeClr val="accent3"/>
+          </a:effectRef>
+          <a:fontRef idx="minor">
+            <a:schemeClr val="dk1"/>
+          </a:fontRef>
+        </p:style>
+        <p:txBody>
+          <a:bodyPr rtlCol="0" anchor="ctr"/>
+          <a:lstStyle/>
+          <a:p>
+            <a:pPr algn="ctr"/>
+            <a:r>
+              <a:rPr lang="en-CA" sz="1400" dirty="0"/>
+              <a:t>.NET Core 3.1 Framework  </a:t>
+            </a:r>
+          </a:p>
+        </p:txBody>
+      </p:sp>
+      <p:sp>
+        <p:nvSpPr>
+          <p:cNvPr id="21" name="Arrow: Right 20">
+            <a:extLst>
+              <a:ext uri="{FF2B5EF4-FFF2-40B4-BE49-F238E27FC236}">
+                <a16:creationId xmlns:a16="http://schemas.microsoft.com/office/drawing/2014/main" id="{6DA09267-FEEE-47FD-A68A-85BB92D96D28}"/>
+              </a:ext>
+            </a:extLst>
+          </p:cNvPr>
+          <p:cNvSpPr/>
+          <p:nvPr/>
+        </p:nvSpPr>
+        <p:spPr>
+          <a:xfrm>
+            <a:off x="3054234" y="2121285"/>
+            <a:ext cx="329184" cy="320040"/>
+          </a:xfrm>
+          <a:prstGeom prst="rightArrow">
+            <a:avLst/>
+          </a:prstGeom>
+        </p:spPr>
+        <p:style>
+          <a:lnRef idx="2">
+            <a:schemeClr val="accent1">
+              <a:shade val="50000"/>
+            </a:schemeClr>
+          </a:lnRef>
+          <a:fillRef idx="1">
+            <a:schemeClr val="accent1"/>
+          </a:fillRef>
+          <a:effectRef idx="0">
+            <a:schemeClr val="accent1"/>
+          </a:effectRef>
+          <a:fontRef idx="minor">
+            <a:schemeClr val="lt1"/>
+          </a:fontRef>
+        </p:style>
+        <p:txBody>
+          <a:bodyPr rtlCol="0" anchor="ctr"/>
+          <a:lstStyle/>
+          <a:p>
+            <a:pPr algn="ctr"/>
+            <a:endParaRPr lang="en-CA"/>
+          </a:p>
+        </p:txBody>
+      </p:sp>
+      <p:sp>
+        <p:nvSpPr>
+          <p:cNvPr id="22" name="Arrow: Right 21">
+            <a:extLst>
+              <a:ext uri="{FF2B5EF4-FFF2-40B4-BE49-F238E27FC236}">
+                <a16:creationId xmlns:a16="http://schemas.microsoft.com/office/drawing/2014/main" id="{F42799F9-1FD4-450D-9DA6-0D0279F7B760}"/>
+              </a:ext>
+            </a:extLst>
+          </p:cNvPr>
+          <p:cNvSpPr/>
+          <p:nvPr/>
+        </p:nvSpPr>
+        <p:spPr>
+          <a:xfrm>
+            <a:off x="3038972" y="2817546"/>
+            <a:ext cx="329184" cy="320040"/>
+          </a:xfrm>
+          <a:prstGeom prst="rightArrow">
+            <a:avLst/>
+          </a:prstGeom>
+        </p:spPr>
+        <p:style>
+          <a:lnRef idx="2">
+            <a:schemeClr val="accent1">
+              <a:shade val="50000"/>
+            </a:schemeClr>
+          </a:lnRef>
+          <a:fillRef idx="1">
+            <a:schemeClr val="accent1"/>
+          </a:fillRef>
+          <a:effectRef idx="0">
+            <a:schemeClr val="accent1"/>
+          </a:effectRef>
+          <a:fontRef idx="minor">
+            <a:schemeClr val="lt1"/>
+          </a:fontRef>
+        </p:style>
+        <p:txBody>
+          <a:bodyPr rtlCol="0" anchor="ctr"/>
+          <a:lstStyle/>
+          <a:p>
+            <a:pPr algn="ctr"/>
+            <a:endParaRPr lang="en-CA"/>
+          </a:p>
+        </p:txBody>
+      </p:sp>
+      <p:sp>
+        <p:nvSpPr>
+          <p:cNvPr id="27" name="Arrow: Right 26">
+            <a:extLst>
+              <a:ext uri="{FF2B5EF4-FFF2-40B4-BE49-F238E27FC236}">
+                <a16:creationId xmlns:a16="http://schemas.microsoft.com/office/drawing/2014/main" id="{5DE2EAAD-39DB-42B8-A7DF-2C61CD65BF81}"/>
+              </a:ext>
+            </a:extLst>
+          </p:cNvPr>
+          <p:cNvSpPr/>
+          <p:nvPr/>
+        </p:nvSpPr>
+        <p:spPr>
+          <a:xfrm>
+            <a:off x="8845301" y="2011556"/>
+            <a:ext cx="329184" cy="1269423"/>
+          </a:xfrm>
+          <a:prstGeom prst="rightArrow">
+            <a:avLst/>
+          </a:prstGeom>
+        </p:spPr>
+        <p:style>
+          <a:lnRef idx="2">
+            <a:schemeClr val="accent1">
+              <a:shade val="50000"/>
+            </a:schemeClr>
+          </a:lnRef>
+          <a:fillRef idx="1">
+            <a:schemeClr val="accent1"/>
+          </a:fillRef>
+          <a:effectRef idx="0">
+            <a:schemeClr val="accent1"/>
+          </a:effectRef>
+          <a:fontRef idx="minor">
+            <a:schemeClr val="lt1"/>
+          </a:fontRef>
+        </p:style>
+        <p:txBody>
+          <a:bodyPr rtlCol="0" anchor="ctr"/>
+          <a:lstStyle/>
+          <a:p>
+            <a:pPr algn="ctr"/>
+            <a:endParaRPr lang="en-CA"/>
+          </a:p>
+        </p:txBody>
+      </p:sp>
+      <p:sp>
+        <p:nvSpPr>
+          <p:cNvPr id="30" name="Arrow: Right 29">
+            <a:extLst>
+              <a:ext uri="{FF2B5EF4-FFF2-40B4-BE49-F238E27FC236}">
+                <a16:creationId xmlns:a16="http://schemas.microsoft.com/office/drawing/2014/main" id="{36612411-2C8D-4E65-BAA5-AC7A7AB0FD79}"/>
+              </a:ext>
+            </a:extLst>
+          </p:cNvPr>
+          <p:cNvSpPr/>
+          <p:nvPr/>
+        </p:nvSpPr>
+        <p:spPr>
+          <a:xfrm>
+            <a:off x="5973994" y="1988389"/>
+            <a:ext cx="329184" cy="1269423"/>
+          </a:xfrm>
+          <a:prstGeom prst="rightArrow">
+            <a:avLst/>
+          </a:prstGeom>
+        </p:spPr>
+        <p:style>
+          <a:lnRef idx="2">
+            <a:schemeClr val="accent1">
+              <a:shade val="50000"/>
+            </a:schemeClr>
+          </a:lnRef>
+          <a:fillRef idx="1">
+            <a:schemeClr val="accent1"/>
+          </a:fillRef>
+          <a:effectRef idx="0">
+            <a:schemeClr val="accent1"/>
+          </a:effectRef>
+          <a:fontRef idx="minor">
+            <a:schemeClr val="lt1"/>
+          </a:fontRef>
+        </p:style>
+        <p:txBody>
+          <a:bodyPr rtlCol="0" anchor="ctr"/>
+          <a:lstStyle/>
+          <a:p>
+            <a:pPr algn="ctr"/>
+            <a:endParaRPr lang="en-CA"/>
+          </a:p>
+        </p:txBody>
+      </p:sp>
+      <p:sp>
+        <p:nvSpPr>
+          <p:cNvPr id="31" name="Arrow: Left-Right 30">
+            <a:extLst>
+              <a:ext uri="{FF2B5EF4-FFF2-40B4-BE49-F238E27FC236}">
+                <a16:creationId xmlns:a16="http://schemas.microsoft.com/office/drawing/2014/main" id="{F445DF81-4DC5-4B81-9E8D-F028568D7645}"/>
+              </a:ext>
+            </a:extLst>
+          </p:cNvPr>
+          <p:cNvSpPr/>
+          <p:nvPr/>
+        </p:nvSpPr>
+        <p:spPr>
+          <a:xfrm>
+            <a:off x="8782226" y="1346827"/>
+            <a:ext cx="410547" cy="270028"/>
+          </a:xfrm>
+          <a:prstGeom prst="leftRightArrow">
+            <a:avLst/>
+          </a:prstGeom>
+          <a:solidFill>
+            <a:srgbClr val="7030A0"/>
+          </a:solidFill>
+        </p:spPr>
+        <p:style>
+          <a:lnRef idx="2">
+            <a:schemeClr val="accent1">
+              <a:shade val="50000"/>
+            </a:schemeClr>
+          </a:lnRef>
+          <a:fillRef idx="1">
+            <a:schemeClr val="accent1"/>
+          </a:fillRef>
+          <a:effectRef idx="0">
+            <a:schemeClr val="accent1"/>
+          </a:effectRef>
+          <a:fontRef idx="minor">
+            <a:schemeClr val="lt1"/>
+          </a:fontRef>
+        </p:style>
+        <p:txBody>
+          <a:bodyPr rtlCol="0" anchor="ctr"/>
+          <a:lstStyle/>
+          <a:p>
+            <a:pPr algn="ctr"/>
+            <a:endParaRPr lang="en-CA"/>
+          </a:p>
+        </p:txBody>
+      </p:sp>
+      <p:sp>
+        <p:nvSpPr>
+          <p:cNvPr id="32" name="Arrow: Left-Right 31">
+            <a:extLst>
+              <a:ext uri="{FF2B5EF4-FFF2-40B4-BE49-F238E27FC236}">
+                <a16:creationId xmlns:a16="http://schemas.microsoft.com/office/drawing/2014/main" id="{5B18E8FA-09AB-4592-908F-64DEAF769D32}"/>
+              </a:ext>
+            </a:extLst>
+          </p:cNvPr>
+          <p:cNvSpPr/>
+          <p:nvPr/>
+        </p:nvSpPr>
+        <p:spPr>
+          <a:xfrm>
+            <a:off x="5905003" y="1347246"/>
+            <a:ext cx="410547" cy="270028"/>
+          </a:xfrm>
+          <a:prstGeom prst="leftRightArrow">
+            <a:avLst/>
+          </a:prstGeom>
+          <a:solidFill>
+            <a:srgbClr val="7030A0"/>
+          </a:solidFill>
+        </p:spPr>
+        <p:style>
+          <a:lnRef idx="2">
+            <a:schemeClr val="accent1">
+              <a:shade val="50000"/>
+            </a:schemeClr>
+          </a:lnRef>
+          <a:fillRef idx="1">
+            <a:schemeClr val="accent1"/>
+          </a:fillRef>
+          <a:effectRef idx="0">
+            <a:schemeClr val="accent1"/>
+          </a:effectRef>
+          <a:fontRef idx="minor">
+            <a:schemeClr val="lt1"/>
+          </a:fontRef>
+        </p:style>
+        <p:txBody>
+          <a:bodyPr rtlCol="0" anchor="ctr"/>
+          <a:lstStyle/>
+          <a:p>
+            <a:pPr algn="ctr"/>
+            <a:endParaRPr lang="en-CA"/>
+          </a:p>
+        </p:txBody>
+      </p:sp>
+      <p:sp>
+        <p:nvSpPr>
+          <p:cNvPr id="34" name="TextBox 33">
+            <a:extLst>
+              <a:ext uri="{FF2B5EF4-FFF2-40B4-BE49-F238E27FC236}">
+                <a16:creationId xmlns:a16="http://schemas.microsoft.com/office/drawing/2014/main" id="{9F8B5AC2-7455-4C20-9B9A-D2BFB61E957D}"/>
+              </a:ext>
+            </a:extLst>
+          </p:cNvPr>
+          <p:cNvSpPr txBox="1"/>
+          <p:nvPr/>
+        </p:nvSpPr>
+        <p:spPr>
+          <a:xfrm>
+            <a:off x="-1549638" y="-401062"/>
+            <a:ext cx="14323805" cy="954107"/>
+          </a:xfrm>
+          <a:prstGeom prst="rect">
+            <a:avLst/>
+          </a:prstGeom>
+          <a:noFill/>
+        </p:spPr>
+        <p:txBody>
+          <a:bodyPr wrap="square" rtlCol="0">
+            <a:spAutoFit/>
+          </a:bodyPr>
+          <a:lstStyle/>
+          <a:p>
+            <a:r>
+              <a:rPr lang="en-CA" sz="2400" dirty="0"/>
+              <a:t>Trusted Digital Web: Microsoft “Trinity” Graph Engine – July 2021</a:t>
+            </a:r>
+          </a:p>
+          <a:p>
+            <a:r>
+              <a:rPr lang="en-CA" dirty="0"/>
+              <a:t>Michael Herman, Trusted Digital Web, Hyperonomy Digital Identity Lab, Parallelspace Corporation</a:t>
+            </a:r>
+          </a:p>
+          <a:p>
+            <a:r>
+              <a:rPr lang="en-CA" sz="1400" dirty="0"/>
+              <a:t>https://www.graphengine.io/</a:t>
+            </a:r>
+          </a:p>
+        </p:txBody>
+      </p:sp>
+      <p:cxnSp>
+        <p:nvCxnSpPr>
+          <p:cNvPr id="35" name="Straight Connector 34">
+            <a:extLst>
+              <a:ext uri="{FF2B5EF4-FFF2-40B4-BE49-F238E27FC236}">
+                <a16:creationId xmlns:a16="http://schemas.microsoft.com/office/drawing/2014/main" id="{0AE76B18-6E2B-4810-AC3F-4D68A75C9D0C}"/>
+              </a:ext>
+            </a:extLst>
+          </p:cNvPr>
+          <p:cNvCxnSpPr>
+            <a:cxnSpLocks/>
+          </p:cNvCxnSpPr>
+          <p:nvPr/>
+        </p:nvCxnSpPr>
+        <p:spPr>
+          <a:xfrm>
+            <a:off x="2995121" y="1876480"/>
+            <a:ext cx="9779047" cy="0"/>
+          </a:xfrm>
+          <a:prstGeom prst="line">
+            <a:avLst/>
+          </a:prstGeom>
+          <a:ln w="57150">
+            <a:solidFill>
+              <a:srgbClr val="C00000"/>
+            </a:solidFill>
+          </a:ln>
+        </p:spPr>
+        <p:style>
+          <a:lnRef idx="1">
+            <a:schemeClr val="accent1"/>
+          </a:lnRef>
+          <a:fillRef idx="0">
+            <a:schemeClr val="accent1"/>
+          </a:fillRef>
+          <a:effectRef idx="0">
+            <a:schemeClr val="accent1"/>
+          </a:effectRef>
+          <a:fontRef idx="minor">
+            <a:schemeClr val="tx1"/>
+          </a:fontRef>
+        </p:style>
+      </p:cxnSp>
+      <p:sp>
+        <p:nvSpPr>
+          <p:cNvPr id="38" name="TextBox 37">
+            <a:extLst>
+              <a:ext uri="{FF2B5EF4-FFF2-40B4-BE49-F238E27FC236}">
+                <a16:creationId xmlns:a16="http://schemas.microsoft.com/office/drawing/2014/main" id="{3CD16DC9-7BF4-476F-8552-4F8CFEFD65C2}"/>
+              </a:ext>
+            </a:extLst>
+          </p:cNvPr>
+          <p:cNvSpPr txBox="1"/>
+          <p:nvPr/>
+        </p:nvSpPr>
+        <p:spPr>
+          <a:xfrm>
+            <a:off x="11712898" y="1071758"/>
+            <a:ext cx="1142620" cy="1815882"/>
+          </a:xfrm>
+          <a:prstGeom prst="rect">
+            <a:avLst/>
+          </a:prstGeom>
+          <a:noFill/>
+        </p:spPr>
+        <p:txBody>
+          <a:bodyPr wrap="none" rtlCol="0" anchor="ctr">
+            <a:spAutoFit/>
+          </a:bodyPr>
+          <a:lstStyle/>
+          <a:p>
+            <a:r>
+              <a:rPr lang="en-CA" sz="1400" dirty="0">
+                <a:solidFill>
+                  <a:srgbClr val="C00000"/>
+                </a:solidFill>
+              </a:rPr>
+              <a:t>Graph</a:t>
+            </a:r>
+          </a:p>
+          <a:p>
+            <a:r>
+              <a:rPr lang="en-CA" sz="1400" dirty="0">
+                <a:solidFill>
+                  <a:srgbClr val="C00000"/>
+                </a:solidFill>
+              </a:rPr>
+              <a:t>Data</a:t>
+            </a:r>
+          </a:p>
+          <a:p>
+            <a:r>
+              <a:rPr lang="en-CA" sz="1400" dirty="0">
+                <a:solidFill>
+                  <a:srgbClr val="C00000"/>
+                </a:solidFill>
+              </a:rPr>
+              <a:t>Model</a:t>
+            </a:r>
+          </a:p>
+          <a:p>
+            <a:endParaRPr lang="en-CA" sz="1400" dirty="0">
+              <a:solidFill>
+                <a:srgbClr val="C00000"/>
+              </a:solidFill>
+            </a:endParaRPr>
+          </a:p>
+          <a:p>
+            <a:r>
+              <a:rPr lang="en-CA" sz="1400" dirty="0">
+                <a:solidFill>
+                  <a:srgbClr val="C00000"/>
+                </a:solidFill>
+              </a:rPr>
+              <a:t>Distributed</a:t>
+            </a:r>
+          </a:p>
+          <a:p>
+            <a:r>
+              <a:rPr lang="en-CA" sz="1400" dirty="0">
+                <a:solidFill>
+                  <a:srgbClr val="C00000"/>
+                </a:solidFill>
+              </a:rPr>
+              <a:t>Messaging &amp;</a:t>
+            </a:r>
+            <a:br>
+              <a:rPr lang="en-CA" sz="1400" dirty="0">
+                <a:solidFill>
+                  <a:srgbClr val="C00000"/>
+                </a:solidFill>
+              </a:rPr>
+            </a:br>
+            <a:r>
+              <a:rPr lang="en-CA" sz="1400" dirty="0">
+                <a:solidFill>
+                  <a:srgbClr val="C00000"/>
+                </a:solidFill>
+              </a:rPr>
+              <a:t>Computation</a:t>
+            </a:r>
+          </a:p>
+          <a:p>
+            <a:r>
+              <a:rPr lang="en-CA" sz="1400" dirty="0">
+                <a:solidFill>
+                  <a:srgbClr val="C00000"/>
+                </a:solidFill>
+              </a:rPr>
+              <a:t>Model</a:t>
+            </a:r>
+          </a:p>
+        </p:txBody>
+      </p:sp>
+      <p:sp>
+        <p:nvSpPr>
+          <p:cNvPr id="39" name="Rectangle: Rounded Corners 38">
+            <a:extLst>
+              <a:ext uri="{FF2B5EF4-FFF2-40B4-BE49-F238E27FC236}">
+                <a16:creationId xmlns:a16="http://schemas.microsoft.com/office/drawing/2014/main" id="{8D4CF51D-5083-4671-9E72-33ED97E29C61}"/>
+              </a:ext>
+            </a:extLst>
+          </p:cNvPr>
+          <p:cNvSpPr/>
+          <p:nvPr/>
+        </p:nvSpPr>
+        <p:spPr>
+          <a:xfrm rot="16200000">
+            <a:off x="10814290" y="4313915"/>
+            <a:ext cx="1937440" cy="724675"/>
+          </a:xfrm>
+          <a:prstGeom prst="roundRect">
+            <a:avLst/>
+          </a:prstGeom>
+        </p:spPr>
+        <p:style>
+          <a:lnRef idx="1">
+            <a:schemeClr val="accent3"/>
+          </a:lnRef>
+          <a:fillRef idx="2">
+            <a:schemeClr val="accent3"/>
+          </a:fillRef>
+          <a:effectRef idx="1">
+            <a:schemeClr val="accent3"/>
+          </a:effectRef>
+          <a:fontRef idx="minor">
+            <a:schemeClr val="dk1"/>
+          </a:fontRef>
+        </p:style>
+        <p:txBody>
+          <a:bodyPr rtlCol="0" anchor="ctr"/>
+          <a:lstStyle/>
+          <a:p>
+            <a:pPr algn="ctr"/>
+            <a:r>
+              <a:rPr lang="en-CA" sz="1400" dirty="0"/>
+              <a:t>External Services</a:t>
+            </a:r>
+          </a:p>
+          <a:p>
+            <a:pPr algn="ctr"/>
+            <a:r>
+              <a:rPr lang="en-CA" sz="1400" dirty="0"/>
+              <a:t>(e.g. Distributed Ledgers)</a:t>
+            </a:r>
+          </a:p>
+        </p:txBody>
+      </p:sp>
+      <p:sp>
+        <p:nvSpPr>
+          <p:cNvPr id="40" name="Arrow: Left-Right 39">
+            <a:extLst>
+              <a:ext uri="{FF2B5EF4-FFF2-40B4-BE49-F238E27FC236}">
+                <a16:creationId xmlns:a16="http://schemas.microsoft.com/office/drawing/2014/main" id="{76008886-5331-42C1-9DEE-6DBD05CF4F0E}"/>
+              </a:ext>
+            </a:extLst>
+          </p:cNvPr>
+          <p:cNvSpPr/>
+          <p:nvPr/>
+        </p:nvSpPr>
+        <p:spPr>
+          <a:xfrm rot="5400000">
+            <a:off x="11614472" y="3354670"/>
+            <a:ext cx="336040" cy="270028"/>
+          </a:xfrm>
+          <a:prstGeom prst="leftRightArrow">
+            <a:avLst/>
+          </a:prstGeom>
+          <a:solidFill>
+            <a:srgbClr val="00B050"/>
+          </a:solidFill>
+        </p:spPr>
+        <p:style>
+          <a:lnRef idx="2">
+            <a:schemeClr val="accent1">
+              <a:shade val="50000"/>
+            </a:schemeClr>
+          </a:lnRef>
+          <a:fillRef idx="1">
+            <a:schemeClr val="accent1"/>
+          </a:fillRef>
+          <a:effectRef idx="0">
+            <a:schemeClr val="accent1"/>
+          </a:effectRef>
+          <a:fontRef idx="minor">
+            <a:schemeClr val="lt1"/>
+          </a:fontRef>
+        </p:style>
+        <p:txBody>
+          <a:bodyPr rtlCol="0" anchor="ctr"/>
+          <a:lstStyle/>
+          <a:p>
+            <a:pPr algn="ctr"/>
+            <a:endParaRPr lang="en-CA"/>
+          </a:p>
+        </p:txBody>
+      </p:sp>
+      <p:sp>
+        <p:nvSpPr>
+          <p:cNvPr id="41" name="Arrow: Down 40">
+            <a:extLst>
+              <a:ext uri="{FF2B5EF4-FFF2-40B4-BE49-F238E27FC236}">
+                <a16:creationId xmlns:a16="http://schemas.microsoft.com/office/drawing/2014/main" id="{33FA4482-3ECF-4396-BE4E-BE3F7D0B8AAC}"/>
+              </a:ext>
+            </a:extLst>
+          </p:cNvPr>
+          <p:cNvSpPr/>
+          <p:nvPr/>
+        </p:nvSpPr>
+        <p:spPr>
+          <a:xfrm rot="10800000">
+            <a:off x="2171761" y="3347042"/>
+            <a:ext cx="310896" cy="286680"/>
+          </a:xfrm>
+          <a:prstGeom prst="downArrow">
+            <a:avLst/>
+          </a:prstGeom>
+          <a:solidFill>
+            <a:srgbClr val="00B0F0"/>
+          </a:solidFill>
+        </p:spPr>
+        <p:style>
+          <a:lnRef idx="2">
+            <a:schemeClr val="accent1">
+              <a:shade val="50000"/>
+            </a:schemeClr>
+          </a:lnRef>
+          <a:fillRef idx="1">
+            <a:schemeClr val="accent1"/>
+          </a:fillRef>
+          <a:effectRef idx="0">
+            <a:schemeClr val="accent1"/>
+          </a:effectRef>
+          <a:fontRef idx="minor">
+            <a:schemeClr val="lt1"/>
+          </a:fontRef>
+        </p:style>
+        <p:txBody>
+          <a:bodyPr rtlCol="0" anchor="ctr"/>
+          <a:lstStyle/>
+          <a:p>
+            <a:pPr algn="ctr"/>
+            <a:endParaRPr lang="en-CA"/>
+          </a:p>
+        </p:txBody>
+      </p:sp>
+      <p:sp>
+        <p:nvSpPr>
+          <p:cNvPr id="42" name="Arrow: Left-Right 41">
+            <a:extLst>
+              <a:ext uri="{FF2B5EF4-FFF2-40B4-BE49-F238E27FC236}">
+                <a16:creationId xmlns:a16="http://schemas.microsoft.com/office/drawing/2014/main" id="{D86F219E-ED3F-45A0-9140-9191AE10C686}"/>
+              </a:ext>
+            </a:extLst>
+          </p:cNvPr>
+          <p:cNvSpPr/>
+          <p:nvPr/>
+        </p:nvSpPr>
+        <p:spPr>
+          <a:xfrm>
+            <a:off x="3024947" y="1361973"/>
+            <a:ext cx="410547" cy="270028"/>
+          </a:xfrm>
+          <a:prstGeom prst="leftRightArrow">
+            <a:avLst/>
+          </a:prstGeom>
+          <a:solidFill>
+            <a:srgbClr val="7030A0"/>
+          </a:solidFill>
+        </p:spPr>
+        <p:style>
+          <a:lnRef idx="2">
+            <a:schemeClr val="accent1">
+              <a:shade val="50000"/>
+            </a:schemeClr>
+          </a:lnRef>
+          <a:fillRef idx="1">
+            <a:schemeClr val="accent1"/>
+          </a:fillRef>
+          <a:effectRef idx="0">
+            <a:schemeClr val="accent1"/>
+          </a:effectRef>
+          <a:fontRef idx="minor">
+            <a:schemeClr val="lt1"/>
+          </a:fontRef>
+        </p:style>
+        <p:txBody>
+          <a:bodyPr rtlCol="0" anchor="ctr"/>
+          <a:lstStyle/>
+          <a:p>
+            <a:pPr algn="ctr"/>
+            <a:endParaRPr lang="en-CA"/>
+          </a:p>
+        </p:txBody>
+      </p:sp>
+    </p:spTree>
+    <p:extLst>
+      <p:ext uri="{BB962C8B-B14F-4D97-AF65-F5344CB8AC3E}">
+        <p14:creationId xmlns:p14="http://schemas.microsoft.com/office/powerpoint/2010/main" val="1360430165"/>
       </p:ext>
     </p:extLst>
   </p:cSld>

</xml_diff>

<commit_message>
Added UBL Invoice schema (incomplete)
</commit_message>
<xml_diff>
--- a/Documentation/TDW-TCSServer 0.22.pptx
+++ b/Documentation/TDW-TCSServer 0.22.pptx
@@ -198,7 +198,7 @@
           <a:p>
             <a:fld id="{0FE97333-F009-4A3A-B903-E0B0959E57FD}" type="datetimeFigureOut">
               <a:rPr lang="en-CA" smtClean="0"/>
-              <a:t>2021-07-08</a:t>
+              <a:t>2021-07-11</a:t>
             </a:fld>
             <a:endParaRPr lang="en-CA" dirty="0"/>
           </a:p>
@@ -699,7 +699,7 @@
           <a:p>
             <a:fld id="{8336BBF9-328D-4796-8CD7-E88E84193EF3}" type="datetimeFigureOut">
               <a:rPr lang="en-CA" smtClean="0"/>
-              <a:t>2021-07-08</a:t>
+              <a:t>2021-07-11</a:t>
             </a:fld>
             <a:endParaRPr lang="en-CA" dirty="0"/>
           </a:p>
@@ -899,7 +899,7 @@
           <a:p>
             <a:fld id="{8336BBF9-328D-4796-8CD7-E88E84193EF3}" type="datetimeFigureOut">
               <a:rPr lang="en-CA" smtClean="0"/>
-              <a:t>2021-07-08</a:t>
+              <a:t>2021-07-11</a:t>
             </a:fld>
             <a:endParaRPr lang="en-CA" dirty="0"/>
           </a:p>
@@ -1109,7 +1109,7 @@
           <a:p>
             <a:fld id="{8336BBF9-328D-4796-8CD7-E88E84193EF3}" type="datetimeFigureOut">
               <a:rPr lang="en-CA" smtClean="0"/>
-              <a:t>2021-07-08</a:t>
+              <a:t>2021-07-11</a:t>
             </a:fld>
             <a:endParaRPr lang="en-CA" dirty="0"/>
           </a:p>
@@ -1309,7 +1309,7 @@
           <a:p>
             <a:fld id="{8336BBF9-328D-4796-8CD7-E88E84193EF3}" type="datetimeFigureOut">
               <a:rPr lang="en-CA" smtClean="0"/>
-              <a:t>2021-07-08</a:t>
+              <a:t>2021-07-11</a:t>
             </a:fld>
             <a:endParaRPr lang="en-CA" dirty="0"/>
           </a:p>
@@ -1585,7 +1585,7 @@
           <a:p>
             <a:fld id="{8336BBF9-328D-4796-8CD7-E88E84193EF3}" type="datetimeFigureOut">
               <a:rPr lang="en-CA" smtClean="0"/>
-              <a:t>2021-07-08</a:t>
+              <a:t>2021-07-11</a:t>
             </a:fld>
             <a:endParaRPr lang="en-CA" dirty="0"/>
           </a:p>
@@ -1853,7 +1853,7 @@
           <a:p>
             <a:fld id="{8336BBF9-328D-4796-8CD7-E88E84193EF3}" type="datetimeFigureOut">
               <a:rPr lang="en-CA" smtClean="0"/>
-              <a:t>2021-07-08</a:t>
+              <a:t>2021-07-11</a:t>
             </a:fld>
             <a:endParaRPr lang="en-CA" dirty="0"/>
           </a:p>
@@ -2268,7 +2268,7 @@
           <a:p>
             <a:fld id="{8336BBF9-328D-4796-8CD7-E88E84193EF3}" type="datetimeFigureOut">
               <a:rPr lang="en-CA" smtClean="0"/>
-              <a:t>2021-07-08</a:t>
+              <a:t>2021-07-11</a:t>
             </a:fld>
             <a:endParaRPr lang="en-CA" dirty="0"/>
           </a:p>
@@ -2410,7 +2410,7 @@
           <a:p>
             <a:fld id="{8336BBF9-328D-4796-8CD7-E88E84193EF3}" type="datetimeFigureOut">
               <a:rPr lang="en-CA" smtClean="0"/>
-              <a:t>2021-07-08</a:t>
+              <a:t>2021-07-11</a:t>
             </a:fld>
             <a:endParaRPr lang="en-CA" dirty="0"/>
           </a:p>
@@ -2523,7 +2523,7 @@
           <a:p>
             <a:fld id="{8336BBF9-328D-4796-8CD7-E88E84193EF3}" type="datetimeFigureOut">
               <a:rPr lang="en-CA" smtClean="0"/>
-              <a:t>2021-07-08</a:t>
+              <a:t>2021-07-11</a:t>
             </a:fld>
             <a:endParaRPr lang="en-CA" dirty="0"/>
           </a:p>
@@ -2836,7 +2836,7 @@
           <a:p>
             <a:fld id="{8336BBF9-328D-4796-8CD7-E88E84193EF3}" type="datetimeFigureOut">
               <a:rPr lang="en-CA" smtClean="0"/>
-              <a:t>2021-07-08</a:t>
+              <a:t>2021-07-11</a:t>
             </a:fld>
             <a:endParaRPr lang="en-CA" dirty="0"/>
           </a:p>
@@ -3125,7 +3125,7 @@
           <a:p>
             <a:fld id="{8336BBF9-328D-4796-8CD7-E88E84193EF3}" type="datetimeFigureOut">
               <a:rPr lang="en-CA" smtClean="0"/>
-              <a:t>2021-07-08</a:t>
+              <a:t>2021-07-11</a:t>
             </a:fld>
             <a:endParaRPr lang="en-CA" dirty="0"/>
           </a:p>
@@ -3368,7 +3368,7 @@
           <a:p>
             <a:fld id="{8336BBF9-328D-4796-8CD7-E88E84193EF3}" type="datetimeFigureOut">
               <a:rPr lang="en-CA" smtClean="0"/>
-              <a:t>2021-07-08</a:t>
+              <a:t>2021-07-11</a:t>
             </a:fld>
             <a:endParaRPr lang="en-CA" dirty="0"/>
           </a:p>
@@ -6152,7 +6152,7 @@
           <a:p>
             <a:r>
               <a:rPr lang="en-CA" sz="2400" dirty="0"/>
-              <a:t>Trusted Digital Web: 8-Layer Architecture Reference Model (TDW-ARM) 0.22 – July 2021</a:t>
+              <a:t>Trusted Digital Web: 8-Layer Architecture Reference Model (TDW-ARM) 0.23 – July 2021</a:t>
             </a:r>
           </a:p>
           <a:p>
@@ -8147,6 +8147,12 @@
           <a:prstGeom prst="roundRect">
             <a:avLst/>
           </a:prstGeom>
+          <a:solidFill>
+            <a:schemeClr val="accent4">
+              <a:lumMod val="40000"/>
+              <a:lumOff val="60000"/>
+            </a:schemeClr>
+          </a:solidFill>
         </p:spPr>
         <p:style>
           <a:lnRef idx="2">
@@ -8170,7 +8176,13 @@
           <a:p>
             <a:pPr algn="ctr"/>
             <a:r>
-              <a:rPr lang="en-CA" sz="1400" dirty="0"/>
+              <a:rPr lang="en-CA" sz="1400" dirty="0">
+                <a:solidFill>
+                  <a:schemeClr val="accent4">
+                    <a:lumMod val="50000"/>
+                  </a:schemeClr>
+                </a:solidFill>
+              </a:rPr>
               <a:t>“Trinity” Service Endpoint Handlers (Custom Code)</a:t>
             </a:r>
           </a:p>
@@ -8998,7 +9010,7 @@
           <a:p>
             <a:r>
               <a:rPr lang="en-CA" sz="2400" dirty="0"/>
-              <a:t>Trusted Digital Web: Microsoft “Trinity” Graph Engine – July 2021</a:t>
+              <a:t>Trusted Digital Web: Trusted Resource Agents based on the Microsoft “Trinity” Graph Engine – July 2021</a:t>
             </a:r>
           </a:p>
           <a:p>
@@ -9031,7 +9043,7 @@
         </p:nvCxnSpPr>
         <p:spPr>
           <a:xfrm>
-            <a:off x="2995121" y="1876480"/>
+            <a:off x="2995121" y="1848487"/>
             <a:ext cx="9779047" cy="0"/>
           </a:xfrm>
           <a:prstGeom prst="line">
@@ -9072,8 +9084,8 @@
         </p:nvSpPr>
         <p:spPr>
           <a:xfrm>
-            <a:off x="11712898" y="1071758"/>
-            <a:ext cx="1142620" cy="1815882"/>
+            <a:off x="11712898" y="1025103"/>
+            <a:ext cx="1245854" cy="1815882"/>
           </a:xfrm>
           <a:prstGeom prst="rect">
             <a:avLst/>
@@ -9092,7 +9104,7 @@
                   <a:srgbClr val="C00000"/>
                 </a:solidFill>
               </a:rPr>
-              <a:t>Graph</a:t>
+              <a:t>Schema-based</a:t>
             </a:r>
           </a:p>
           <a:p>
@@ -9102,7 +9114,7 @@
                   <a:srgbClr val="C00000"/>
                 </a:solidFill>
               </a:rPr>
-              <a:t>Data</a:t>
+              <a:t>Resource</a:t>
             </a:r>
           </a:p>
           <a:p>
@@ -9112,7 +9124,7 @@
                   <a:srgbClr val="C00000"/>
                 </a:solidFill>
               </a:rPr>
-              <a:t>Model</a:t>
+              <a:t>Data Model</a:t>
             </a:r>
           </a:p>
           <a:p>
@@ -9164,7 +9176,7 @@
                   <a:srgbClr val="C00000"/>
                 </a:solidFill>
               </a:rPr>
-              <a:t>Model</a:t>
+              <a:t>Agent Model</a:t>
             </a:r>
           </a:p>
         </p:txBody>

</xml_diff>